<commit_message>
Starting changes to CPE module
</commit_message>
<xml_diff>
--- a/modules/CPE/PPT.pptx
+++ b/modules/CPE/PPT.pptx
@@ -4664,7 +4664,11 @@
           <a:p>
             <a:r>
               <a:rPr lang="en-US" dirty="0" smtClean="0"/>
-              <a:t>Consider two situations …</a:t>
+              <a:t>Consider </a:t>
+            </a:r>
+            <a:r>
+              <a:rPr lang="en-US" dirty="0" smtClean="0"/>
+              <a:t>…</a:t>
             </a:r>
           </a:p>
           <a:p>
@@ -4694,8 +4698,12 @@
           </a:p>
           <a:p>
             <a:r>
+              <a:rPr lang="en-US" smtClean="0"/>
+              <a:t>Consider </a:t>
+            </a:r>
+            <a:r>
               <a:rPr lang="en-US" dirty="0" smtClean="0"/>
-              <a:t>Consider another two situations …</a:t>
+              <a:t>…</a:t>
             </a:r>
           </a:p>
           <a:p>
@@ -5052,11 +5060,7 @@
             <a:pPr lvl="1"/>
             <a:r>
               <a:rPr lang="en-US" dirty="0" smtClean="0"/>
-              <a:t>50 </a:t>
-            </a:r>
-            <a:r>
-              <a:rPr lang="en-US" dirty="0" smtClean="0"/>
-              <a:t>Lake </a:t>
+              <a:t>50 Lake </a:t>
             </a:r>
             <a:r>
               <a:rPr lang="en-US" dirty="0"/>
@@ -5064,11 +5068,7 @@
             </a:r>
             <a:r>
               <a:rPr lang="en-US" dirty="0" smtClean="0"/>
-              <a:t>rout </a:t>
-            </a:r>
-            <a:r>
-              <a:rPr lang="en-US" dirty="0" smtClean="0"/>
-              <a:t>in 1600 m of gillnet set for 2 nights</a:t>
+              <a:t>rout in 1600 m of gillnet set for 2 nights</a:t>
             </a:r>
           </a:p>
           <a:p>
@@ -5083,11 +5083,7 @@
             </a:r>
             <a:r>
               <a:rPr lang="en-US" dirty="0" smtClean="0"/>
-              <a:t>rook Trout </a:t>
-            </a:r>
-            <a:r>
-              <a:rPr lang="en-US" dirty="0" smtClean="0"/>
-              <a:t>in 1600 s of electrofishing</a:t>
+              <a:t>rook Trout in 1600 s of electrofishing</a:t>
             </a:r>
           </a:p>
         </p:txBody>

</xml_diff>

<commit_message>
Added to CPE Slides
</commit_message>
<xml_diff>
--- a/modules/CPE/PPT.pptx
+++ b/modules/CPE/PPT.pptx
@@ -5,7 +5,7 @@
     <p:sldMasterId id="2147483648" r:id="rId1"/>
   </p:sldMasterIdLst>
   <p:notesMasterIdLst>
-    <p:notesMasterId r:id="rId9"/>
+    <p:notesMasterId r:id="rId10"/>
   </p:notesMasterIdLst>
   <p:sldIdLst>
     <p:sldId id="305" r:id="rId2"/>
@@ -15,6 +15,7 @@
     <p:sldId id="321" r:id="rId6"/>
     <p:sldId id="322" r:id="rId7"/>
     <p:sldId id="323" r:id="rId8"/>
+    <p:sldId id="324" r:id="rId9"/>
   </p:sldIdLst>
   <p:sldSz cx="9144000" cy="6858000" type="screen4x3"/>
   <p:notesSz cx="6858000" cy="9144000"/>
@@ -4664,11 +4665,7 @@
           <a:p>
             <a:r>
               <a:rPr lang="en-US" dirty="0" smtClean="0"/>
-              <a:t>Consider </a:t>
-            </a:r>
-            <a:r>
-              <a:rPr lang="en-US" dirty="0" smtClean="0"/>
-              <a:t>…</a:t>
+              <a:t>Consider …</a:t>
             </a:r>
           </a:p>
           <a:p>
@@ -7285,6 +7282,138 @@
     <p:extLst>
       <p:ext uri="{BB962C8B-B14F-4D97-AF65-F5344CB8AC3E}">
         <p14:creationId xmlns:p14="http://schemas.microsoft.com/office/powerpoint/2010/main" val="588957937"/>
+      </p:ext>
+    </p:extLst>
+  </p:cSld>
+  <p:clrMapOvr>
+    <a:masterClrMapping/>
+  </p:clrMapOvr>
+  <p:timing>
+    <p:tnLst>
+      <p:par>
+        <p:cTn id="1" dur="indefinite" restart="never" nodeType="tmRoot"/>
+      </p:par>
+    </p:tnLst>
+  </p:timing>
+</p:sld>
+</file>
+
+<file path=ppt/slides/slide8.xml><?xml version="1.0" encoding="utf-8"?>
+<p:sld xmlns:a="http://schemas.openxmlformats.org/drawingml/2006/main" xmlns:r="http://schemas.openxmlformats.org/officeDocument/2006/relationships" xmlns:p="http://schemas.openxmlformats.org/presentationml/2006/main">
+  <p:cSld>
+    <p:spTree>
+      <p:nvGrpSpPr>
+        <p:cNvPr id="1" name=""/>
+        <p:cNvGrpSpPr/>
+        <p:nvPr/>
+      </p:nvGrpSpPr>
+      <p:grpSpPr>
+        <a:xfrm>
+          <a:off x="0" y="0"/>
+          <a:ext cx="0" cy="0"/>
+          <a:chOff x="0" y="0"/>
+          <a:chExt cx="0" cy="0"/>
+        </a:xfrm>
+      </p:grpSpPr>
+      <p:sp>
+        <p:nvSpPr>
+          <p:cNvPr id="2" name="Title 1"/>
+          <p:cNvSpPr>
+            <a:spLocks noGrp="1"/>
+          </p:cNvSpPr>
+          <p:nvPr>
+            <p:ph type="title"/>
+          </p:nvPr>
+        </p:nvSpPr>
+        <p:spPr/>
+        <p:txBody>
+          <a:bodyPr/>
+          <a:lstStyle/>
+          <a:p>
+            <a:endParaRPr lang="en-US"/>
+          </a:p>
+        </p:txBody>
+      </p:sp>
+      <p:sp>
+        <p:nvSpPr>
+          <p:cNvPr id="4" name="Footer Placeholder 3"/>
+          <p:cNvSpPr>
+            <a:spLocks noGrp="1"/>
+          </p:cNvSpPr>
+          <p:nvPr>
+            <p:ph type="ftr" sz="quarter" idx="10"/>
+          </p:nvPr>
+        </p:nvSpPr>
+        <p:spPr/>
+        <p:txBody>
+          <a:bodyPr/>
+          <a:lstStyle/>
+          <a:p>
+            <a:r>
+              <a:rPr lang="en-US" smtClean="0"/>
+              <a:t>Abundance -- CPE</a:t>
+            </a:r>
+            <a:endParaRPr lang="en-US"/>
+          </a:p>
+        </p:txBody>
+      </p:sp>
+      <p:sp>
+        <p:nvSpPr>
+          <p:cNvPr id="5" name="Slide Number Placeholder 4"/>
+          <p:cNvSpPr>
+            <a:spLocks noGrp="1"/>
+          </p:cNvSpPr>
+          <p:nvPr>
+            <p:ph type="sldNum" sz="quarter" idx="11"/>
+          </p:nvPr>
+        </p:nvSpPr>
+        <p:spPr/>
+        <p:txBody>
+          <a:bodyPr/>
+          <a:lstStyle/>
+          <a:p>
+            <a:fld id="{8B8D0034-34A8-4F4F-AD0F-588093AE7929}" type="slidenum">
+              <a:rPr lang="en-US" smtClean="0"/>
+              <a:pPr/>
+              <a:t>8</a:t>
+            </a:fld>
+            <a:endParaRPr lang="en-US"/>
+          </a:p>
+        </p:txBody>
+      </p:sp>
+      <p:pic>
+        <p:nvPicPr>
+          <p:cNvPr id="9" name="Picture 8"/>
+          <p:cNvPicPr>
+            <a:picLocks noChangeAspect="1"/>
+          </p:cNvPicPr>
+          <p:nvPr/>
+        </p:nvPicPr>
+        <p:blipFill rotWithShape="1">
+          <a:blip r:embed="rId2">
+            <a:extLst>
+              <a:ext uri="{28A0092B-C50C-407E-A947-70E740481C1C}">
+                <a14:useLocalDpi xmlns:a14="http://schemas.microsoft.com/office/drawing/2010/main" val="0"/>
+              </a:ext>
+            </a:extLst>
+          </a:blip>
+          <a:srcRect l="6999" t="29326" r="5001" b="4006"/>
+          <a:stretch/>
+        </p:blipFill>
+        <p:spPr>
+          <a:xfrm>
+            <a:off x="640080" y="2011680"/>
+            <a:ext cx="8046720" cy="4572000"/>
+          </a:xfrm>
+          <a:prstGeom prst="rect">
+            <a:avLst/>
+          </a:prstGeom>
+        </p:spPr>
+      </p:pic>
+    </p:spTree>
+    <p:extLst>
+      <p:ext uri="{BB962C8B-B14F-4D97-AF65-F5344CB8AC3E}">
+        <p14:creationId xmlns:p14="http://schemas.microsoft.com/office/powerpoint/2010/main" val="2055229730"/>
       </p:ext>
     </p:extLst>
   </p:cSld>

</xml_diff>